<commit_message>
last PEP 8 checks
</commit_message>
<xml_diff>
--- a/2.7 and 2.8 Documentation - Samuel Burgess.pptx
+++ b/2.7 and 2.8 Documentation - Samuel Burgess.pptx
@@ -171,7 +171,7 @@
 <file path=ppt/revisionInfo.xml><?xml version="1.0" encoding="utf-8"?>
 <p1510:revInfo xmlns:a="http://schemas.openxmlformats.org/drawingml/2006/main" xmlns:r="http://schemas.openxmlformats.org/officeDocument/2006/relationships" xmlns:p1510="http://schemas.microsoft.com/office/powerpoint/2015/10/main">
   <p1510:revLst>
-    <p1510:client id="{B91FAD40-2AEC-4C70-BADE-C63AC44F5637}" v="16" dt="2023-05-21T21:41:58.190"/>
+    <p1510:client id="{B91FAD40-2AEC-4C70-BADE-C63AC44F5637}" v="20" dt="2023-05-25T02:51:24.439"/>
   </p1510:revLst>
 </p1510:revInfo>
 </file>
@@ -181,18 +181,18 @@
   <pc:docChgLst>
     <pc:chgData name="Samuel Burgess" userId="875ce21e-2db9-4c64-8a73-adac5c404a46" providerId="ADAL" clId="{B91FAD40-2AEC-4C70-BADE-C63AC44F5637}"/>
     <pc:docChg chg="undo custSel addSld modSld sldOrd">
-      <pc:chgData name="Samuel Burgess" userId="875ce21e-2db9-4c64-8a73-adac5c404a46" providerId="ADAL" clId="{B91FAD40-2AEC-4C70-BADE-C63AC44F5637}" dt="2023-05-21T21:54:10.619" v="7804" actId="20577"/>
+      <pc:chgData name="Samuel Burgess" userId="875ce21e-2db9-4c64-8a73-adac5c404a46" providerId="ADAL" clId="{B91FAD40-2AEC-4C70-BADE-C63AC44F5637}" dt="2023-05-25T02:51:05.150" v="7808" actId="20577"/>
       <pc:docMkLst>
         <pc:docMk/>
       </pc:docMkLst>
       <pc:sldChg chg="modSp mod">
-        <pc:chgData name="Samuel Burgess" userId="875ce21e-2db9-4c64-8a73-adac5c404a46" providerId="ADAL" clId="{B91FAD40-2AEC-4C70-BADE-C63AC44F5637}" dt="2023-05-11T03:06:02.157" v="1101"/>
+        <pc:chgData name="Samuel Burgess" userId="875ce21e-2db9-4c64-8a73-adac5c404a46" providerId="ADAL" clId="{B91FAD40-2AEC-4C70-BADE-C63AC44F5637}" dt="2023-05-25T02:51:05.150" v="7808" actId="20577"/>
         <pc:sldMkLst>
           <pc:docMk/>
           <pc:sldMk cId="3838895173" sldId="258"/>
         </pc:sldMkLst>
         <pc:spChg chg="mod">
-          <ac:chgData name="Samuel Burgess" userId="875ce21e-2db9-4c64-8a73-adac5c404a46" providerId="ADAL" clId="{B91FAD40-2AEC-4C70-BADE-C63AC44F5637}" dt="2023-05-11T03:06:02.157" v="1101"/>
+          <ac:chgData name="Samuel Burgess" userId="875ce21e-2db9-4c64-8a73-adac5c404a46" providerId="ADAL" clId="{B91FAD40-2AEC-4C70-BADE-C63AC44F5637}" dt="2023-05-25T02:51:05.150" v="7808" actId="20577"/>
           <ac:spMkLst>
             <pc:docMk/>
             <pc:sldMk cId="3838895173" sldId="258"/>
@@ -3288,7 +3288,7 @@
           <a:p>
             <a:fld id="{F37D28C0-BEB6-42B0-A203-EEE1023219C4}" type="datetimeFigureOut">
               <a:rPr lang="en-NZ" smtClean="0"/>
-              <a:t>22/05/2023</a:t>
+              <a:t>25/05/2023</a:t>
             </a:fld>
             <a:endParaRPr lang="en-NZ"/>
           </a:p>
@@ -8905,7 +8905,7 @@
           <a:p>
             <a:fld id="{9C4A4F43-1C06-40E6-8F87-8B286982E50E}" type="datetimeFigureOut">
               <a:rPr lang="en-NZ" smtClean="0"/>
-              <a:t>22/05/2023</a:t>
+              <a:t>25/05/2023</a:t>
             </a:fld>
             <a:endParaRPr lang="en-NZ" dirty="0"/>
           </a:p>
@@ -9105,7 +9105,7 @@
           <a:p>
             <a:fld id="{9C4A4F43-1C06-40E6-8F87-8B286982E50E}" type="datetimeFigureOut">
               <a:rPr lang="en-NZ" smtClean="0"/>
-              <a:t>22/05/2023</a:t>
+              <a:t>25/05/2023</a:t>
             </a:fld>
             <a:endParaRPr lang="en-NZ" dirty="0"/>
           </a:p>
@@ -9315,7 +9315,7 @@
           <a:p>
             <a:fld id="{9C4A4F43-1C06-40E6-8F87-8B286982E50E}" type="datetimeFigureOut">
               <a:rPr lang="en-NZ" smtClean="0"/>
-              <a:t>22/05/2023</a:t>
+              <a:t>25/05/2023</a:t>
             </a:fld>
             <a:endParaRPr lang="en-NZ" dirty="0"/>
           </a:p>
@@ -9874,7 +9874,7 @@
           <a:p>
             <a:fld id="{9C4A4F43-1C06-40E6-8F87-8B286982E50E}" type="datetimeFigureOut">
               <a:rPr lang="en-NZ" smtClean="0"/>
-              <a:t>22/05/2023</a:t>
+              <a:t>25/05/2023</a:t>
             </a:fld>
             <a:endParaRPr lang="en-NZ" dirty="0"/>
           </a:p>
@@ -10150,7 +10150,7 @@
           <a:p>
             <a:fld id="{9C4A4F43-1C06-40E6-8F87-8B286982E50E}" type="datetimeFigureOut">
               <a:rPr lang="en-NZ" smtClean="0"/>
-              <a:t>22/05/2023</a:t>
+              <a:t>25/05/2023</a:t>
             </a:fld>
             <a:endParaRPr lang="en-NZ" dirty="0"/>
           </a:p>
@@ -10418,7 +10418,7 @@
           <a:p>
             <a:fld id="{9C4A4F43-1C06-40E6-8F87-8B286982E50E}" type="datetimeFigureOut">
               <a:rPr lang="en-NZ" smtClean="0"/>
-              <a:t>22/05/2023</a:t>
+              <a:t>25/05/2023</a:t>
             </a:fld>
             <a:endParaRPr lang="en-NZ" dirty="0"/>
           </a:p>
@@ -10833,7 +10833,7 @@
           <a:p>
             <a:fld id="{9C4A4F43-1C06-40E6-8F87-8B286982E50E}" type="datetimeFigureOut">
               <a:rPr lang="en-NZ" smtClean="0"/>
-              <a:t>22/05/2023</a:t>
+              <a:t>25/05/2023</a:t>
             </a:fld>
             <a:endParaRPr lang="en-NZ" dirty="0"/>
           </a:p>
@@ -10975,7 +10975,7 @@
           <a:p>
             <a:fld id="{9C4A4F43-1C06-40E6-8F87-8B286982E50E}" type="datetimeFigureOut">
               <a:rPr lang="en-NZ" smtClean="0"/>
-              <a:t>22/05/2023</a:t>
+              <a:t>25/05/2023</a:t>
             </a:fld>
             <a:endParaRPr lang="en-NZ" dirty="0"/>
           </a:p>
@@ -11088,7 +11088,7 @@
           <a:p>
             <a:fld id="{9C4A4F43-1C06-40E6-8F87-8B286982E50E}" type="datetimeFigureOut">
               <a:rPr lang="en-NZ" smtClean="0"/>
-              <a:t>22/05/2023</a:t>
+              <a:t>25/05/2023</a:t>
             </a:fld>
             <a:endParaRPr lang="en-NZ" dirty="0"/>
           </a:p>
@@ -11401,7 +11401,7 @@
           <a:p>
             <a:fld id="{9C4A4F43-1C06-40E6-8F87-8B286982E50E}" type="datetimeFigureOut">
               <a:rPr lang="en-NZ" smtClean="0"/>
-              <a:t>22/05/2023</a:t>
+              <a:t>25/05/2023</a:t>
             </a:fld>
             <a:endParaRPr lang="en-NZ" dirty="0"/>
           </a:p>
@@ -11690,7 +11690,7 @@
           <a:p>
             <a:fld id="{9C4A4F43-1C06-40E6-8F87-8B286982E50E}" type="datetimeFigureOut">
               <a:rPr lang="en-NZ" smtClean="0"/>
-              <a:t>22/05/2023</a:t>
+              <a:t>25/05/2023</a:t>
             </a:fld>
             <a:endParaRPr lang="en-NZ" dirty="0"/>
           </a:p>
@@ -11933,7 +11933,7 @@
           <a:p>
             <a:fld id="{9C4A4F43-1C06-40E6-8F87-8B286982E50E}" type="datetimeFigureOut">
               <a:rPr lang="en-NZ" smtClean="0"/>
-              <a:t>22/05/2023</a:t>
+              <a:t>25/05/2023</a:t>
             </a:fld>
             <a:endParaRPr lang="en-NZ" dirty="0"/>
           </a:p>
@@ -17194,15 +17194,16 @@
                   <a:srgbClr val="274E13"/>
                 </a:solidFill>
               </a:rPr>
-              <a:t>Link to GitHub Repository</a:t>
+              <a:t>Link to GitHub Repository: </a:t>
             </a:r>
             <a:r>
-              <a:rPr lang="en-NZ" sz="2000" b="1">
+              <a:rPr lang="en-NZ" sz="2000" b="1" dirty="0">
                 <a:solidFill>
                   <a:srgbClr val="274E13"/>
                 </a:solidFill>
+                <a:hlinkClick r:id="rId2"/>
               </a:rPr>
-              <a:t>: https://github.com/Samuel-Burgess/2.7-2.8-Assesment-Monster-Card-CatalogueLinks </a:t>
+              <a:t>GitHub</a:t>
             </a:r>
             <a:r>
               <a:rPr lang="en-NZ" sz="2000" b="1" dirty="0">
@@ -17210,8 +17211,46 @@
                   <a:srgbClr val="274E13"/>
                 </a:solidFill>
               </a:rPr>
-              <a:t>to Trello board / project management tools: https://trello.com/b/KBUnldZT/assesment-2023-monster-card</a:t>
+              <a:t> </a:t>
             </a:r>
+          </a:p>
+          <a:p>
+            <a:pPr marL="0" indent="0">
+              <a:lnSpc>
+                <a:spcPct val="100000"/>
+              </a:lnSpc>
+              <a:spcBef>
+                <a:spcPts val="0"/>
+              </a:spcBef>
+              <a:buClr>
+                <a:schemeClr val="dk1"/>
+              </a:buClr>
+              <a:buSzPts val="1100"/>
+              <a:buFont typeface="Arial"/>
+              <a:buNone/>
+            </a:pPr>
+            <a:r>
+              <a:rPr lang="en-NZ" sz="2000" b="1" dirty="0">
+                <a:solidFill>
+                  <a:srgbClr val="274E13"/>
+                </a:solidFill>
+              </a:rPr>
+              <a:t>project management tools: </a:t>
+            </a:r>
+            <a:r>
+              <a:rPr lang="en-NZ" sz="2000" b="1" dirty="0">
+                <a:solidFill>
+                  <a:srgbClr val="274E13"/>
+                </a:solidFill>
+                <a:hlinkClick r:id="rId3"/>
+              </a:rPr>
+              <a:t>Trello</a:t>
+            </a:r>
+            <a:endParaRPr lang="en-NZ" sz="2000" b="1" dirty="0">
+              <a:solidFill>
+                <a:srgbClr val="274E13"/>
+              </a:solidFill>
+            </a:endParaRPr>
           </a:p>
           <a:p>
             <a:pPr marL="0" indent="0">
@@ -17233,8 +17272,30 @@
                   <a:srgbClr val="274E13"/>
                 </a:solidFill>
               </a:rPr>
-              <a:t>Link to final version of your program: [here]</a:t>
+              <a:t>Link to final version of your program</a:t>
             </a:r>
+            <a:r>
+              <a:rPr lang="en-NZ" sz="2000" b="1">
+                <a:solidFill>
+                  <a:srgbClr val="274E13"/>
+                </a:solidFill>
+              </a:rPr>
+              <a:t>: </a:t>
+            </a:r>
+            <a:r>
+              <a:rPr lang="en-NZ" sz="2000" b="1">
+                <a:solidFill>
+                  <a:srgbClr val="274E13"/>
+                </a:solidFill>
+                <a:hlinkClick r:id="rId4"/>
+              </a:rPr>
+              <a:t>Final version</a:t>
+            </a:r>
+            <a:endParaRPr lang="en-NZ" sz="2000" b="1" dirty="0">
+              <a:solidFill>
+                <a:srgbClr val="274E13"/>
+              </a:solidFill>
+            </a:endParaRPr>
           </a:p>
           <a:p>
             <a:pPr marL="0" indent="0">

</xml_diff>